<commit_message>
Add networking docs for awsbatch
Signed-off-by: Francesco De Martino <fdm@amazon.com>
</commit_message>
<xml_diff>
--- a/docs/images/parallelcluster_networking.pptx
+++ b/docs/images/parallelcluster_networking.pptx
@@ -5,12 +5,13 @@
     <p:sldMasterId id="2147483648" r:id="rId1"/>
   </p:sldMasterIdLst>
   <p:notesMasterIdLst>
-    <p:notesMasterId r:id="rId5"/>
+    <p:notesMasterId r:id="rId6"/>
   </p:notesMasterIdLst>
   <p:sldIdLst>
     <p:sldId id="256" r:id="rId2"/>
     <p:sldId id="257" r:id="rId3"/>
     <p:sldId id="258" r:id="rId4"/>
+    <p:sldId id="259" r:id="rId5"/>
   </p:sldIdLst>
   <p:sldSz cx="9144000" cy="6858000" type="screen4x3"/>
   <p:notesSz cx="6858000" cy="9144000"/>
@@ -109,6 +110,22 @@
       </a:defRPr>
     </a:lvl9pPr>
   </p:defaultTextStyle>
+  <p:extLst>
+    <p:ext uri="{EFAFB233-063F-42B5-8137-9DF3F51BA10A}">
+      <p15:sldGuideLst xmlns:p15="http://schemas.microsoft.com/office/powerpoint/2012/main">
+        <p15:guide id="1" orient="horz" pos="2160">
+          <p15:clr>
+            <a:srgbClr val="A4A3A4"/>
+          </p15:clr>
+        </p15:guide>
+        <p15:guide id="2" pos="2880">
+          <p15:clr>
+            <a:srgbClr val="A4A3A4"/>
+          </p15:clr>
+        </p15:guide>
+      </p15:sldGuideLst>
+    </p:ext>
+  </p:extLst>
 </p:presentation>
 </file>
 
@@ -194,7 +211,7 @@
           <a:p>
             <a:fld id="{9969925B-AC44-B141-8F64-09643C7A01F1}" type="datetimeFigureOut">
               <a:rPr lang="en-US" smtClean="0"/>
-              <a:t>1/4/15</a:t>
+              <a:t>11/26/18</a:t>
             </a:fld>
             <a:endParaRPr lang="en-US"/>
           </a:p>
@@ -258,38 +275,37 @@
           <a:p>
             <a:pPr lvl="0"/>
             <a:r>
-              <a:rPr lang="en-US" smtClean="0"/>
+              <a:rPr lang="en-US"/>
               <a:t>Click to edit Master text styles</a:t>
             </a:r>
           </a:p>
           <a:p>
             <a:pPr lvl="1"/>
             <a:r>
-              <a:rPr lang="en-US" smtClean="0"/>
+              <a:rPr lang="en-US"/>
               <a:t>Second level</a:t>
             </a:r>
           </a:p>
           <a:p>
             <a:pPr lvl="2"/>
             <a:r>
-              <a:rPr lang="en-US" smtClean="0"/>
+              <a:rPr lang="en-US"/>
               <a:t>Third level</a:t>
             </a:r>
           </a:p>
           <a:p>
             <a:pPr lvl="3"/>
             <a:r>
-              <a:rPr lang="en-US" smtClean="0"/>
+              <a:rPr lang="en-US"/>
               <a:t>Fourth level</a:t>
             </a:r>
           </a:p>
           <a:p>
             <a:pPr lvl="4"/>
             <a:r>
-              <a:rPr lang="en-US" smtClean="0"/>
+              <a:rPr lang="en-US"/>
               <a:t>Fifth level</a:t>
             </a:r>
-            <a:endParaRPr lang="en-US"/>
           </a:p>
         </p:txBody>
       </p:sp>
@@ -507,14 +523,13 @@
           <a:lstStyle/>
           <a:p>
             <a:r>
-              <a:rPr lang="en-US" dirty="0" err="1" smtClean="0"/>
+              <a:rPr lang="en-US" dirty="0" err="1"/>
               <a:t>Cfncluster</a:t>
             </a:r>
             <a:r>
-              <a:rPr lang="en-US" dirty="0" smtClean="0"/>
+              <a:rPr lang="en-US" dirty="0"/>
               <a:t> single subnet</a:t>
             </a:r>
-            <a:endParaRPr lang="en-US" dirty="0"/>
           </a:p>
         </p:txBody>
       </p:sp>
@@ -599,14 +614,13 @@
           <a:lstStyle/>
           <a:p>
             <a:r>
-              <a:rPr lang="en-US" dirty="0" err="1" smtClean="0"/>
+              <a:rPr lang="en-US" dirty="0" err="1"/>
               <a:t>Cfncluster</a:t>
             </a:r>
             <a:r>
-              <a:rPr lang="en-US" dirty="0" smtClean="0"/>
+              <a:rPr lang="en-US" dirty="0"/>
               <a:t> two subnets</a:t>
             </a:r>
-            <a:endParaRPr lang="en-US" dirty="0"/>
           </a:p>
         </p:txBody>
       </p:sp>
@@ -691,19 +705,19 @@
           <a:lstStyle/>
           <a:p>
             <a:r>
-              <a:rPr lang="en-US" dirty="0" err="1" smtClean="0"/>
+              <a:rPr lang="en-US" dirty="0" err="1"/>
               <a:t>Cfncluster</a:t>
             </a:r>
             <a:r>
-              <a:rPr lang="en-US" dirty="0" smtClean="0"/>
+              <a:rPr lang="en-US" dirty="0"/>
               <a:t> </a:t>
             </a:r>
             <a:r>
-              <a:rPr lang="en-US" smtClean="0"/>
+              <a:rPr lang="en-US"/>
               <a:t>private with</a:t>
             </a:r>
             <a:r>
-              <a:rPr lang="en-US" baseline="0" smtClean="0"/>
+              <a:rPr lang="en-US" baseline="0"/>
               <a:t> DX</a:t>
             </a:r>
             <a:endParaRPr lang="en-US" dirty="0"/>
@@ -737,6 +751,97 @@
     <p:extLst>
       <p:ext uri="{BB962C8B-B14F-4D97-AF65-F5344CB8AC3E}">
         <p14:creationId xmlns:p14="http://schemas.microsoft.com/office/powerpoint/2010/main" val="3113074494"/>
+      </p:ext>
+    </p:extLst>
+  </p:cSld>
+  <p:clrMapOvr>
+    <a:masterClrMapping/>
+  </p:clrMapOvr>
+</p:notes>
+</file>
+
+<file path=ppt/notesSlides/notesSlide4.xml><?xml version="1.0" encoding="utf-8"?>
+<p:notes xmlns:a="http://schemas.openxmlformats.org/drawingml/2006/main" xmlns:r="http://schemas.openxmlformats.org/officeDocument/2006/relationships" xmlns:p="http://schemas.openxmlformats.org/presentationml/2006/main">
+  <p:cSld>
+    <p:spTree>
+      <p:nvGrpSpPr>
+        <p:cNvPr id="1" name=""/>
+        <p:cNvGrpSpPr/>
+        <p:nvPr/>
+      </p:nvGrpSpPr>
+      <p:grpSpPr>
+        <a:xfrm>
+          <a:off x="0" y="0"/>
+          <a:ext cx="0" cy="0"/>
+          <a:chOff x="0" y="0"/>
+          <a:chExt cx="0" cy="0"/>
+        </a:xfrm>
+      </p:grpSpPr>
+      <p:sp>
+        <p:nvSpPr>
+          <p:cNvPr id="2" name="Slide Image Placeholder 1"/>
+          <p:cNvSpPr>
+            <a:spLocks noGrp="1" noRot="1" noChangeAspect="1"/>
+          </p:cNvSpPr>
+          <p:nvPr>
+            <p:ph type="sldImg"/>
+          </p:nvPr>
+        </p:nvSpPr>
+        <p:spPr/>
+      </p:sp>
+      <p:sp>
+        <p:nvSpPr>
+          <p:cNvPr id="3" name="Notes Placeholder 2"/>
+          <p:cNvSpPr>
+            <a:spLocks noGrp="1"/>
+          </p:cNvSpPr>
+          <p:nvPr>
+            <p:ph type="body" idx="1"/>
+          </p:nvPr>
+        </p:nvSpPr>
+        <p:spPr/>
+        <p:txBody>
+          <a:bodyPr/>
+          <a:lstStyle/>
+          <a:p>
+            <a:r>
+              <a:rPr lang="en-US" dirty="0" err="1"/>
+              <a:t>Cfncluster</a:t>
+            </a:r>
+            <a:r>
+              <a:rPr lang="en-US" dirty="0"/>
+              <a:t> two subnets</a:t>
+            </a:r>
+          </a:p>
+        </p:txBody>
+      </p:sp>
+      <p:sp>
+        <p:nvSpPr>
+          <p:cNvPr id="4" name="Slide Number Placeholder 3"/>
+          <p:cNvSpPr>
+            <a:spLocks noGrp="1"/>
+          </p:cNvSpPr>
+          <p:nvPr>
+            <p:ph type="sldNum" sz="quarter" idx="10"/>
+          </p:nvPr>
+        </p:nvSpPr>
+        <p:spPr/>
+        <p:txBody>
+          <a:bodyPr/>
+          <a:lstStyle/>
+          <a:p>
+            <a:fld id="{412D8A9A-D7E1-9B48-9B96-64F36D16C61A}" type="slidenum">
+              <a:rPr lang="en-US" smtClean="0"/>
+              <a:t>4</a:t>
+            </a:fld>
+            <a:endParaRPr lang="en-US"/>
+          </a:p>
+        </p:txBody>
+      </p:sp>
+    </p:spTree>
+    <p:extLst>
+      <p:ext uri="{BB962C8B-B14F-4D97-AF65-F5344CB8AC3E}">
+        <p14:creationId xmlns:p14="http://schemas.microsoft.com/office/powerpoint/2010/main" val="1161570754"/>
       </p:ext>
     </p:extLst>
   </p:cSld>
@@ -784,10 +889,9 @@
           <a:lstStyle/>
           <a:p>
             <a:r>
-              <a:rPr lang="en-US" smtClean="0"/>
+              <a:rPr lang="en-US"/>
               <a:t>Click to edit Master title style</a:t>
             </a:r>
-            <a:endParaRPr lang="en-US"/>
           </a:p>
         </p:txBody>
       </p:sp>
@@ -903,10 +1007,9 @@
           </a:lstStyle>
           <a:p>
             <a:r>
-              <a:rPr lang="en-US" smtClean="0"/>
+              <a:rPr lang="en-US"/>
               <a:t>Click to edit Master subtitle style</a:t>
             </a:r>
-            <a:endParaRPr lang="en-US"/>
           </a:p>
         </p:txBody>
       </p:sp>
@@ -927,7 +1030,7 @@
           <a:p>
             <a:fld id="{E495602E-A871-104C-8CA4-348484235D5C}" type="datetimeFigureOut">
               <a:rPr lang="en-US" smtClean="0"/>
-              <a:t>1/4/15</a:t>
+              <a:t>11/26/18</a:t>
             </a:fld>
             <a:endParaRPr lang="en-US"/>
           </a:p>
@@ -1021,10 +1124,9 @@
           <a:lstStyle/>
           <a:p>
             <a:r>
-              <a:rPr lang="en-US" smtClean="0"/>
+              <a:rPr lang="en-US"/>
               <a:t>Click to edit Master title style</a:t>
             </a:r>
-            <a:endParaRPr lang="en-US"/>
           </a:p>
         </p:txBody>
       </p:sp>
@@ -1045,38 +1147,37 @@
           <a:p>
             <a:pPr lvl="0"/>
             <a:r>
-              <a:rPr lang="en-US" smtClean="0"/>
+              <a:rPr lang="en-US"/>
               <a:t>Click to edit Master text styles</a:t>
             </a:r>
           </a:p>
           <a:p>
             <a:pPr lvl="1"/>
             <a:r>
-              <a:rPr lang="en-US" smtClean="0"/>
+              <a:rPr lang="en-US"/>
               <a:t>Second level</a:t>
             </a:r>
           </a:p>
           <a:p>
             <a:pPr lvl="2"/>
             <a:r>
-              <a:rPr lang="en-US" smtClean="0"/>
+              <a:rPr lang="en-US"/>
               <a:t>Third level</a:t>
             </a:r>
           </a:p>
           <a:p>
             <a:pPr lvl="3"/>
             <a:r>
-              <a:rPr lang="en-US" smtClean="0"/>
+              <a:rPr lang="en-US"/>
               <a:t>Fourth level</a:t>
             </a:r>
           </a:p>
           <a:p>
             <a:pPr lvl="4"/>
             <a:r>
-              <a:rPr lang="en-US" smtClean="0"/>
+              <a:rPr lang="en-US"/>
               <a:t>Fifth level</a:t>
             </a:r>
-            <a:endParaRPr lang="en-US"/>
           </a:p>
         </p:txBody>
       </p:sp>
@@ -1097,7 +1198,7 @@
           <a:p>
             <a:fld id="{E495602E-A871-104C-8CA4-348484235D5C}" type="datetimeFigureOut">
               <a:rPr lang="en-US" smtClean="0"/>
-              <a:t>1/4/15</a:t>
+              <a:t>11/26/18</a:t>
             </a:fld>
             <a:endParaRPr lang="en-US"/>
           </a:p>
@@ -1196,10 +1297,9 @@
           <a:lstStyle/>
           <a:p>
             <a:r>
-              <a:rPr lang="en-US" smtClean="0"/>
+              <a:rPr lang="en-US"/>
               <a:t>Click to edit Master title style</a:t>
             </a:r>
-            <a:endParaRPr lang="en-US"/>
           </a:p>
         </p:txBody>
       </p:sp>
@@ -1225,38 +1325,37 @@
           <a:p>
             <a:pPr lvl="0"/>
             <a:r>
-              <a:rPr lang="en-US" smtClean="0"/>
+              <a:rPr lang="en-US"/>
               <a:t>Click to edit Master text styles</a:t>
             </a:r>
           </a:p>
           <a:p>
             <a:pPr lvl="1"/>
             <a:r>
-              <a:rPr lang="en-US" smtClean="0"/>
+              <a:rPr lang="en-US"/>
               <a:t>Second level</a:t>
             </a:r>
           </a:p>
           <a:p>
             <a:pPr lvl="2"/>
             <a:r>
-              <a:rPr lang="en-US" smtClean="0"/>
+              <a:rPr lang="en-US"/>
               <a:t>Third level</a:t>
             </a:r>
           </a:p>
           <a:p>
             <a:pPr lvl="3"/>
             <a:r>
-              <a:rPr lang="en-US" smtClean="0"/>
+              <a:rPr lang="en-US"/>
               <a:t>Fourth level</a:t>
             </a:r>
           </a:p>
           <a:p>
             <a:pPr lvl="4"/>
             <a:r>
-              <a:rPr lang="en-US" smtClean="0"/>
+              <a:rPr lang="en-US"/>
               <a:t>Fifth level</a:t>
             </a:r>
-            <a:endParaRPr lang="en-US"/>
           </a:p>
         </p:txBody>
       </p:sp>
@@ -1277,7 +1376,7 @@
           <a:p>
             <a:fld id="{E495602E-A871-104C-8CA4-348484235D5C}" type="datetimeFigureOut">
               <a:rPr lang="en-US" smtClean="0"/>
-              <a:t>1/4/15</a:t>
+              <a:t>11/26/18</a:t>
             </a:fld>
             <a:endParaRPr lang="en-US"/>
           </a:p>
@@ -1371,10 +1470,9 @@
           <a:lstStyle/>
           <a:p>
             <a:r>
-              <a:rPr lang="en-US" smtClean="0"/>
+              <a:rPr lang="en-US"/>
               <a:t>Click to edit Master title style</a:t>
             </a:r>
-            <a:endParaRPr lang="en-US"/>
           </a:p>
         </p:txBody>
       </p:sp>
@@ -1395,38 +1493,37 @@
           <a:p>
             <a:pPr lvl="0"/>
             <a:r>
-              <a:rPr lang="en-US" smtClean="0"/>
+              <a:rPr lang="en-US"/>
               <a:t>Click to edit Master text styles</a:t>
             </a:r>
           </a:p>
           <a:p>
             <a:pPr lvl="1"/>
             <a:r>
-              <a:rPr lang="en-US" smtClean="0"/>
+              <a:rPr lang="en-US"/>
               <a:t>Second level</a:t>
             </a:r>
           </a:p>
           <a:p>
             <a:pPr lvl="2"/>
             <a:r>
-              <a:rPr lang="en-US" smtClean="0"/>
+              <a:rPr lang="en-US"/>
               <a:t>Third level</a:t>
             </a:r>
           </a:p>
           <a:p>
             <a:pPr lvl="3"/>
             <a:r>
-              <a:rPr lang="en-US" smtClean="0"/>
+              <a:rPr lang="en-US"/>
               <a:t>Fourth level</a:t>
             </a:r>
           </a:p>
           <a:p>
             <a:pPr lvl="4"/>
             <a:r>
-              <a:rPr lang="en-US" smtClean="0"/>
+              <a:rPr lang="en-US"/>
               <a:t>Fifth level</a:t>
             </a:r>
-            <a:endParaRPr lang="en-US"/>
           </a:p>
         </p:txBody>
       </p:sp>
@@ -1447,7 +1544,7 @@
           <a:p>
             <a:fld id="{E495602E-A871-104C-8CA4-348484235D5C}" type="datetimeFigureOut">
               <a:rPr lang="en-US" smtClean="0"/>
-              <a:t>1/4/15</a:t>
+              <a:t>11/26/18</a:t>
             </a:fld>
             <a:endParaRPr lang="en-US"/>
           </a:p>
@@ -1550,10 +1647,9 @@
           </a:lstStyle>
           <a:p>
             <a:r>
-              <a:rPr lang="en-US" smtClean="0"/>
+              <a:rPr lang="en-US"/>
               <a:t>Click to edit Master title style</a:t>
             </a:r>
-            <a:endParaRPr lang="en-US"/>
           </a:p>
         </p:txBody>
       </p:sp>
@@ -1670,7 +1766,7 @@
           <a:p>
             <a:pPr lvl="0"/>
             <a:r>
-              <a:rPr lang="en-US" smtClean="0"/>
+              <a:rPr lang="en-US"/>
               <a:t>Click to edit Master text styles</a:t>
             </a:r>
           </a:p>
@@ -1693,7 +1789,7 @@
           <a:p>
             <a:fld id="{E495602E-A871-104C-8CA4-348484235D5C}" type="datetimeFigureOut">
               <a:rPr lang="en-US" smtClean="0"/>
-              <a:t>1/4/15</a:t>
+              <a:t>11/26/18</a:t>
             </a:fld>
             <a:endParaRPr lang="en-US"/>
           </a:p>
@@ -1787,10 +1883,9 @@
           <a:lstStyle/>
           <a:p>
             <a:r>
-              <a:rPr lang="en-US" smtClean="0"/>
+              <a:rPr lang="en-US"/>
               <a:t>Click to edit Master title style</a:t>
             </a:r>
-            <a:endParaRPr lang="en-US"/>
           </a:p>
         </p:txBody>
       </p:sp>
@@ -1844,38 +1939,37 @@
           <a:p>
             <a:pPr lvl="0"/>
             <a:r>
-              <a:rPr lang="en-US" smtClean="0"/>
+              <a:rPr lang="en-US"/>
               <a:t>Click to edit Master text styles</a:t>
             </a:r>
           </a:p>
           <a:p>
             <a:pPr lvl="1"/>
             <a:r>
-              <a:rPr lang="en-US" smtClean="0"/>
+              <a:rPr lang="en-US"/>
               <a:t>Second level</a:t>
             </a:r>
           </a:p>
           <a:p>
             <a:pPr lvl="2"/>
             <a:r>
-              <a:rPr lang="en-US" smtClean="0"/>
+              <a:rPr lang="en-US"/>
               <a:t>Third level</a:t>
             </a:r>
           </a:p>
           <a:p>
             <a:pPr lvl="3"/>
             <a:r>
-              <a:rPr lang="en-US" smtClean="0"/>
+              <a:rPr lang="en-US"/>
               <a:t>Fourth level</a:t>
             </a:r>
           </a:p>
           <a:p>
             <a:pPr lvl="4"/>
             <a:r>
-              <a:rPr lang="en-US" smtClean="0"/>
+              <a:rPr lang="en-US"/>
               <a:t>Fifth level</a:t>
             </a:r>
-            <a:endParaRPr lang="en-US"/>
           </a:p>
         </p:txBody>
       </p:sp>
@@ -1929,38 +2023,37 @@
           <a:p>
             <a:pPr lvl="0"/>
             <a:r>
-              <a:rPr lang="en-US" smtClean="0"/>
+              <a:rPr lang="en-US"/>
               <a:t>Click to edit Master text styles</a:t>
             </a:r>
           </a:p>
           <a:p>
             <a:pPr lvl="1"/>
             <a:r>
-              <a:rPr lang="en-US" smtClean="0"/>
+              <a:rPr lang="en-US"/>
               <a:t>Second level</a:t>
             </a:r>
           </a:p>
           <a:p>
             <a:pPr lvl="2"/>
             <a:r>
-              <a:rPr lang="en-US" smtClean="0"/>
+              <a:rPr lang="en-US"/>
               <a:t>Third level</a:t>
             </a:r>
           </a:p>
           <a:p>
             <a:pPr lvl="3"/>
             <a:r>
-              <a:rPr lang="en-US" smtClean="0"/>
+              <a:rPr lang="en-US"/>
               <a:t>Fourth level</a:t>
             </a:r>
           </a:p>
           <a:p>
             <a:pPr lvl="4"/>
             <a:r>
-              <a:rPr lang="en-US" smtClean="0"/>
+              <a:rPr lang="en-US"/>
               <a:t>Fifth level</a:t>
             </a:r>
-            <a:endParaRPr lang="en-US"/>
           </a:p>
         </p:txBody>
       </p:sp>
@@ -1981,7 +2074,7 @@
           <a:p>
             <a:fld id="{E495602E-A871-104C-8CA4-348484235D5C}" type="datetimeFigureOut">
               <a:rPr lang="en-US" smtClean="0"/>
-              <a:t>1/4/15</a:t>
+              <a:t>11/26/18</a:t>
             </a:fld>
             <a:endParaRPr lang="en-US"/>
           </a:p>
@@ -2079,10 +2172,9 @@
           </a:lstStyle>
           <a:p>
             <a:r>
-              <a:rPr lang="en-US" smtClean="0"/>
+              <a:rPr lang="en-US"/>
               <a:t>Click to edit Master title style</a:t>
             </a:r>
-            <a:endParaRPr lang="en-US"/>
           </a:p>
         </p:txBody>
       </p:sp>
@@ -2145,7 +2237,7 @@
           <a:p>
             <a:pPr lvl="0"/>
             <a:r>
-              <a:rPr lang="en-US" smtClean="0"/>
+              <a:rPr lang="en-US"/>
               <a:t>Click to edit Master text styles</a:t>
             </a:r>
           </a:p>
@@ -2201,38 +2293,37 @@
           <a:p>
             <a:pPr lvl="0"/>
             <a:r>
-              <a:rPr lang="en-US" smtClean="0"/>
+              <a:rPr lang="en-US"/>
               <a:t>Click to edit Master text styles</a:t>
             </a:r>
           </a:p>
           <a:p>
             <a:pPr lvl="1"/>
             <a:r>
-              <a:rPr lang="en-US" smtClean="0"/>
+              <a:rPr lang="en-US"/>
               <a:t>Second level</a:t>
             </a:r>
           </a:p>
           <a:p>
             <a:pPr lvl="2"/>
             <a:r>
-              <a:rPr lang="en-US" smtClean="0"/>
+              <a:rPr lang="en-US"/>
               <a:t>Third level</a:t>
             </a:r>
           </a:p>
           <a:p>
             <a:pPr lvl="3"/>
             <a:r>
-              <a:rPr lang="en-US" smtClean="0"/>
+              <a:rPr lang="en-US"/>
               <a:t>Fourth level</a:t>
             </a:r>
           </a:p>
           <a:p>
             <a:pPr lvl="4"/>
             <a:r>
-              <a:rPr lang="en-US" smtClean="0"/>
+              <a:rPr lang="en-US"/>
               <a:t>Fifth level</a:t>
             </a:r>
-            <a:endParaRPr lang="en-US"/>
           </a:p>
         </p:txBody>
       </p:sp>
@@ -2295,7 +2386,7 @@
           <a:p>
             <a:pPr lvl="0"/>
             <a:r>
-              <a:rPr lang="en-US" smtClean="0"/>
+              <a:rPr lang="en-US"/>
               <a:t>Click to edit Master text styles</a:t>
             </a:r>
           </a:p>
@@ -2351,38 +2442,37 @@
           <a:p>
             <a:pPr lvl="0"/>
             <a:r>
-              <a:rPr lang="en-US" smtClean="0"/>
+              <a:rPr lang="en-US"/>
               <a:t>Click to edit Master text styles</a:t>
             </a:r>
           </a:p>
           <a:p>
             <a:pPr lvl="1"/>
             <a:r>
-              <a:rPr lang="en-US" smtClean="0"/>
+              <a:rPr lang="en-US"/>
               <a:t>Second level</a:t>
             </a:r>
           </a:p>
           <a:p>
             <a:pPr lvl="2"/>
             <a:r>
-              <a:rPr lang="en-US" smtClean="0"/>
+              <a:rPr lang="en-US"/>
               <a:t>Third level</a:t>
             </a:r>
           </a:p>
           <a:p>
             <a:pPr lvl="3"/>
             <a:r>
-              <a:rPr lang="en-US" smtClean="0"/>
+              <a:rPr lang="en-US"/>
               <a:t>Fourth level</a:t>
             </a:r>
           </a:p>
           <a:p>
             <a:pPr lvl="4"/>
             <a:r>
-              <a:rPr lang="en-US" smtClean="0"/>
+              <a:rPr lang="en-US"/>
               <a:t>Fifth level</a:t>
             </a:r>
-            <a:endParaRPr lang="en-US"/>
           </a:p>
         </p:txBody>
       </p:sp>
@@ -2403,7 +2493,7 @@
           <a:p>
             <a:fld id="{E495602E-A871-104C-8CA4-348484235D5C}" type="datetimeFigureOut">
               <a:rPr lang="en-US" smtClean="0"/>
-              <a:t>1/4/15</a:t>
+              <a:t>11/26/18</a:t>
             </a:fld>
             <a:endParaRPr lang="en-US"/>
           </a:p>
@@ -2497,10 +2587,9 @@
           <a:lstStyle/>
           <a:p>
             <a:r>
-              <a:rPr lang="en-US" smtClean="0"/>
+              <a:rPr lang="en-US"/>
               <a:t>Click to edit Master title style</a:t>
             </a:r>
-            <a:endParaRPr lang="en-US"/>
           </a:p>
         </p:txBody>
       </p:sp>
@@ -2521,7 +2610,7 @@
           <a:p>
             <a:fld id="{E495602E-A871-104C-8CA4-348484235D5C}" type="datetimeFigureOut">
               <a:rPr lang="en-US" smtClean="0"/>
-              <a:t>1/4/15</a:t>
+              <a:t>11/26/18</a:t>
             </a:fld>
             <a:endParaRPr lang="en-US"/>
           </a:p>
@@ -2616,7 +2705,7 @@
           <a:p>
             <a:fld id="{E495602E-A871-104C-8CA4-348484235D5C}" type="datetimeFigureOut">
               <a:rPr lang="en-US" smtClean="0"/>
-              <a:t>1/4/15</a:t>
+              <a:t>11/26/18</a:t>
             </a:fld>
             <a:endParaRPr lang="en-US"/>
           </a:p>
@@ -2719,10 +2808,9 @@
           </a:lstStyle>
           <a:p>
             <a:r>
-              <a:rPr lang="en-US" smtClean="0"/>
+              <a:rPr lang="en-US"/>
               <a:t>Click to edit Master title style</a:t>
             </a:r>
-            <a:endParaRPr lang="en-US"/>
           </a:p>
         </p:txBody>
       </p:sp>
@@ -2776,38 +2864,37 @@
           <a:p>
             <a:pPr lvl="0"/>
             <a:r>
-              <a:rPr lang="en-US" smtClean="0"/>
+              <a:rPr lang="en-US"/>
               <a:t>Click to edit Master text styles</a:t>
             </a:r>
           </a:p>
           <a:p>
             <a:pPr lvl="1"/>
             <a:r>
-              <a:rPr lang="en-US" smtClean="0"/>
+              <a:rPr lang="en-US"/>
               <a:t>Second level</a:t>
             </a:r>
           </a:p>
           <a:p>
             <a:pPr lvl="2"/>
             <a:r>
-              <a:rPr lang="en-US" smtClean="0"/>
+              <a:rPr lang="en-US"/>
               <a:t>Third level</a:t>
             </a:r>
           </a:p>
           <a:p>
             <a:pPr lvl="3"/>
             <a:r>
-              <a:rPr lang="en-US" smtClean="0"/>
+              <a:rPr lang="en-US"/>
               <a:t>Fourth level</a:t>
             </a:r>
           </a:p>
           <a:p>
             <a:pPr lvl="4"/>
             <a:r>
-              <a:rPr lang="en-US" smtClean="0"/>
+              <a:rPr lang="en-US"/>
               <a:t>Fifth level</a:t>
             </a:r>
-            <a:endParaRPr lang="en-US"/>
           </a:p>
         </p:txBody>
       </p:sp>
@@ -2870,7 +2957,7 @@
           <a:p>
             <a:pPr lvl="0"/>
             <a:r>
-              <a:rPr lang="en-US" smtClean="0"/>
+              <a:rPr lang="en-US"/>
               <a:t>Click to edit Master text styles</a:t>
             </a:r>
           </a:p>
@@ -2893,7 +2980,7 @@
           <a:p>
             <a:fld id="{E495602E-A871-104C-8CA4-348484235D5C}" type="datetimeFigureOut">
               <a:rPr lang="en-US" smtClean="0"/>
-              <a:t>1/4/15</a:t>
+              <a:t>11/26/18</a:t>
             </a:fld>
             <a:endParaRPr lang="en-US"/>
           </a:p>
@@ -2996,10 +3083,9 @@
           </a:lstStyle>
           <a:p>
             <a:r>
-              <a:rPr lang="en-US" smtClean="0"/>
+              <a:rPr lang="en-US"/>
               <a:t>Click to edit Master title style</a:t>
             </a:r>
-            <a:endParaRPr lang="en-US"/>
           </a:p>
         </p:txBody>
       </p:sp>
@@ -3123,7 +3209,7 @@
           <a:p>
             <a:pPr lvl="0"/>
             <a:r>
-              <a:rPr lang="en-US" smtClean="0"/>
+              <a:rPr lang="en-US"/>
               <a:t>Click to edit Master text styles</a:t>
             </a:r>
           </a:p>
@@ -3146,7 +3232,7 @@
           <a:p>
             <a:fld id="{E495602E-A871-104C-8CA4-348484235D5C}" type="datetimeFigureOut">
               <a:rPr lang="en-US" smtClean="0"/>
-              <a:t>1/4/15</a:t>
+              <a:t>11/26/18</a:t>
             </a:fld>
             <a:endParaRPr lang="en-US"/>
           </a:p>
@@ -3255,10 +3341,9 @@
           <a:lstStyle/>
           <a:p>
             <a:r>
-              <a:rPr lang="en-US" smtClean="0"/>
+              <a:rPr lang="en-US"/>
               <a:t>Click to edit Master title style</a:t>
             </a:r>
-            <a:endParaRPr lang="en-US"/>
           </a:p>
         </p:txBody>
       </p:sp>
@@ -3289,38 +3374,37 @@
           <a:p>
             <a:pPr lvl="0"/>
             <a:r>
-              <a:rPr lang="en-US" smtClean="0"/>
+              <a:rPr lang="en-US"/>
               <a:t>Click to edit Master text styles</a:t>
             </a:r>
           </a:p>
           <a:p>
             <a:pPr lvl="1"/>
             <a:r>
-              <a:rPr lang="en-US" smtClean="0"/>
+              <a:rPr lang="en-US"/>
               <a:t>Second level</a:t>
             </a:r>
           </a:p>
           <a:p>
             <a:pPr lvl="2"/>
             <a:r>
-              <a:rPr lang="en-US" smtClean="0"/>
+              <a:rPr lang="en-US"/>
               <a:t>Third level</a:t>
             </a:r>
           </a:p>
           <a:p>
             <a:pPr lvl="3"/>
             <a:r>
-              <a:rPr lang="en-US" smtClean="0"/>
+              <a:rPr lang="en-US"/>
               <a:t>Fourth level</a:t>
             </a:r>
           </a:p>
           <a:p>
             <a:pPr lvl="4"/>
             <a:r>
-              <a:rPr lang="en-US" smtClean="0"/>
+              <a:rPr lang="en-US"/>
               <a:t>Fifth level</a:t>
             </a:r>
-            <a:endParaRPr lang="en-US"/>
           </a:p>
         </p:txBody>
       </p:sp>
@@ -3359,7 +3443,7 @@
           <a:p>
             <a:fld id="{E495602E-A871-104C-8CA4-348484235D5C}" type="datetimeFigureOut">
               <a:rPr lang="en-US" smtClean="0"/>
-              <a:t>1/4/15</a:t>
+              <a:t>11/26/18</a:t>
             </a:fld>
             <a:endParaRPr lang="en-US"/>
           </a:p>
@@ -3842,18 +3926,13 @@
             <a:p>
               <a:pPr algn="ctr"/>
               <a:r>
-                <a:rPr lang="en-US" sz="900" dirty="0" smtClean="0">
+                <a:rPr lang="en-US" sz="900" dirty="0">
                   <a:latin typeface="Helvetica Neue"/>
                   <a:ea typeface="Verdana" pitchFamily="34" charset="0"/>
                   <a:cs typeface="Helvetica Neue"/>
                 </a:rPr>
                 <a:t>virtual private cloud</a:t>
               </a:r>
-              <a:endParaRPr lang="en-US" sz="900" dirty="0">
-                <a:latin typeface="Helvetica Neue"/>
-                <a:ea typeface="Verdana" pitchFamily="34" charset="0"/>
-                <a:cs typeface="Helvetica Neue"/>
-              </a:endParaRPr>
             </a:p>
           </p:txBody>
         </p:sp>
@@ -4108,21 +4187,8 @@
                   <a:ea typeface="Verdana" pitchFamily="34" charset="0"/>
                   <a:cs typeface="Helvetica Neue"/>
                 </a:rPr>
-                <a:t>VPC </a:t>
+                <a:t>VPC subnet</a:t>
               </a:r>
-              <a:r>
-                <a:rPr lang="en-US" sz="900" dirty="0" smtClean="0">
-                  <a:latin typeface="Helvetica Neue"/>
-                  <a:ea typeface="Verdana" pitchFamily="34" charset="0"/>
-                  <a:cs typeface="Helvetica Neue"/>
-                </a:rPr>
-                <a:t>subnet</a:t>
-              </a:r>
-              <a:endParaRPr lang="en-US" sz="900" dirty="0">
-                <a:latin typeface="Helvetica Neue"/>
-                <a:ea typeface="Verdana" pitchFamily="34" charset="0"/>
-                <a:cs typeface="Helvetica Neue"/>
-              </a:endParaRPr>
             </a:p>
           </p:txBody>
         </p:sp>
@@ -4249,7 +4315,7 @@
             <a:p>
               <a:pPr algn="ctr"/>
               <a:r>
-                <a:rPr lang="en-US" sz="1000" dirty="0" err="1" smtClean="0">
+                <a:rPr lang="en-US" sz="1000" dirty="0" err="1">
                   <a:latin typeface="Helvetica Neue"/>
                   <a:cs typeface="Helvetica Neue"/>
                 </a:rPr>
@@ -4317,7 +4383,7 @@
           <a:p>
             <a:pPr algn="ctr"/>
             <a:r>
-              <a:rPr lang="en-US" sz="1000" dirty="0" err="1" smtClean="0">
+              <a:rPr lang="en-US" sz="1000" dirty="0" err="1">
                 <a:latin typeface="Helvetica Neue"/>
                 <a:cs typeface="Helvetica Neue"/>
               </a:rPr>
@@ -4354,16 +4420,12 @@
           <a:p>
             <a:pPr algn="ctr"/>
             <a:r>
-              <a:rPr lang="en-US" sz="1000" dirty="0" smtClean="0">
+              <a:rPr lang="en-US" sz="1000" dirty="0">
                 <a:latin typeface="Helvetica Neue"/>
                 <a:cs typeface="Helvetica Neue"/>
               </a:rPr>
               <a:t>IGW</a:t>
             </a:r>
-            <a:endParaRPr lang="en-US" sz="1000" dirty="0">
-              <a:latin typeface="Helvetica Neue"/>
-              <a:cs typeface="Helvetica Neue"/>
-            </a:endParaRPr>
           </a:p>
         </p:txBody>
       </p:sp>
@@ -4475,18 +4537,13 @@
             <a:p>
               <a:pPr algn="ctr"/>
               <a:r>
-                <a:rPr lang="en-US" sz="900" b="1" dirty="0" smtClean="0">
+                <a:rPr lang="en-US" sz="900" b="1" dirty="0">
                   <a:latin typeface="Helvetica Neue"/>
                   <a:ea typeface="Verdana" pitchFamily="34" charset="0"/>
                   <a:cs typeface="Helvetica Neue"/>
                 </a:rPr>
                 <a:t>Auto Scaling group</a:t>
               </a:r>
-              <a:endParaRPr lang="en-US" sz="900" b="1" dirty="0">
-                <a:latin typeface="Helvetica Neue"/>
-                <a:ea typeface="Verdana" pitchFamily="34" charset="0"/>
-                <a:cs typeface="Helvetica Neue"/>
-              </a:endParaRPr>
             </a:p>
           </p:txBody>
         </p:sp>
@@ -4629,18 +4686,13 @@
             <a:p>
               <a:pPr algn="ctr"/>
               <a:r>
-                <a:rPr lang="en-US" sz="900" dirty="0" smtClean="0">
+                <a:rPr lang="en-US" sz="900" dirty="0">
                   <a:latin typeface="Helvetica Neue"/>
                   <a:ea typeface="Verdana" pitchFamily="34" charset="0"/>
                   <a:cs typeface="Helvetica Neue"/>
                 </a:rPr>
                 <a:t>virtual private cloud</a:t>
               </a:r>
-              <a:endParaRPr lang="en-US" sz="900" dirty="0">
-                <a:latin typeface="Helvetica Neue"/>
-                <a:ea typeface="Verdana" pitchFamily="34" charset="0"/>
-                <a:cs typeface="Helvetica Neue"/>
-              </a:endParaRPr>
             </a:p>
           </p:txBody>
         </p:sp>
@@ -4895,21 +4947,8 @@
                   <a:ea typeface="Verdana" pitchFamily="34" charset="0"/>
                   <a:cs typeface="Helvetica Neue"/>
                 </a:rPr>
-                <a:t>VPC </a:t>
+                <a:t>VPC subnet</a:t>
               </a:r>
-              <a:r>
-                <a:rPr lang="en-US" sz="900" dirty="0" smtClean="0">
-                  <a:latin typeface="Helvetica Neue"/>
-                  <a:ea typeface="Verdana" pitchFamily="34" charset="0"/>
-                  <a:cs typeface="Helvetica Neue"/>
-                </a:rPr>
-                <a:t>subnet</a:t>
-              </a:r>
-              <a:endParaRPr lang="en-US" sz="900" dirty="0">
-                <a:latin typeface="Helvetica Neue"/>
-                <a:ea typeface="Verdana" pitchFamily="34" charset="0"/>
-                <a:cs typeface="Helvetica Neue"/>
-              </a:endParaRPr>
             </a:p>
           </p:txBody>
         </p:sp>
@@ -5036,7 +5075,7 @@
             <a:p>
               <a:pPr algn="ctr"/>
               <a:r>
-                <a:rPr lang="en-US" sz="1000" dirty="0" err="1" smtClean="0">
+                <a:rPr lang="en-US" sz="1000" dirty="0" err="1">
                   <a:latin typeface="Helvetica Neue"/>
                   <a:cs typeface="Helvetica Neue"/>
                 </a:rPr>
@@ -5104,7 +5143,7 @@
           <a:p>
             <a:pPr algn="ctr"/>
             <a:r>
-              <a:rPr lang="en-US" sz="1000" dirty="0" err="1" smtClean="0">
+              <a:rPr lang="en-US" sz="1000" dirty="0" err="1">
                 <a:latin typeface="Helvetica Neue"/>
                 <a:cs typeface="Helvetica Neue"/>
               </a:rPr>
@@ -5141,16 +5180,12 @@
           <a:p>
             <a:pPr algn="ctr"/>
             <a:r>
-              <a:rPr lang="en-US" sz="1000" dirty="0" smtClean="0">
+              <a:rPr lang="en-US" sz="1000" dirty="0">
                 <a:latin typeface="Helvetica Neue"/>
                 <a:cs typeface="Helvetica Neue"/>
               </a:rPr>
               <a:t>IGW</a:t>
             </a:r>
-            <a:endParaRPr lang="en-US" sz="1000" dirty="0">
-              <a:latin typeface="Helvetica Neue"/>
-              <a:cs typeface="Helvetica Neue"/>
-            </a:endParaRPr>
           </a:p>
         </p:txBody>
       </p:sp>
@@ -5262,18 +5297,13 @@
             <a:p>
               <a:pPr algn="ctr"/>
               <a:r>
-                <a:rPr lang="en-US" sz="900" b="1" dirty="0" smtClean="0">
+                <a:rPr lang="en-US" sz="900" b="1" dirty="0">
                   <a:latin typeface="Helvetica Neue"/>
                   <a:ea typeface="Verdana" pitchFamily="34" charset="0"/>
                   <a:cs typeface="Helvetica Neue"/>
                 </a:rPr>
                 <a:t>Auto Scaling group</a:t>
               </a:r>
-              <a:endParaRPr lang="en-US" sz="900" b="1" dirty="0">
-                <a:latin typeface="Helvetica Neue"/>
-                <a:ea typeface="Verdana" pitchFamily="34" charset="0"/>
-                <a:cs typeface="Helvetica Neue"/>
-              </a:endParaRPr>
             </a:p>
           </p:txBody>
         </p:sp>
@@ -5391,21 +5421,8 @@
                   <a:ea typeface="Verdana" pitchFamily="34" charset="0"/>
                   <a:cs typeface="Helvetica Neue"/>
                 </a:rPr>
-                <a:t>VPC </a:t>
+                <a:t>VPC subnet</a:t>
               </a:r>
-              <a:r>
-                <a:rPr lang="en-US" sz="900" dirty="0" smtClean="0">
-                  <a:latin typeface="Helvetica Neue"/>
-                  <a:ea typeface="Verdana" pitchFamily="34" charset="0"/>
-                  <a:cs typeface="Helvetica Neue"/>
-                </a:rPr>
-                <a:t>subnet</a:t>
-              </a:r>
-              <a:endParaRPr lang="en-US" sz="900" dirty="0">
-                <a:latin typeface="Helvetica Neue"/>
-                <a:ea typeface="Verdana" pitchFamily="34" charset="0"/>
-                <a:cs typeface="Helvetica Neue"/>
-              </a:endParaRPr>
             </a:p>
           </p:txBody>
         </p:sp>
@@ -5572,18 +5589,13 @@
             <a:p>
               <a:pPr algn="ctr"/>
               <a:r>
-                <a:rPr lang="en-US" sz="900" dirty="0" smtClean="0">
+                <a:rPr lang="en-US" sz="900" dirty="0">
                   <a:latin typeface="Helvetica Neue"/>
                   <a:ea typeface="Verdana" pitchFamily="34" charset="0"/>
                   <a:cs typeface="Helvetica Neue"/>
                 </a:rPr>
                 <a:t>virtual private cloud</a:t>
               </a:r>
-              <a:endParaRPr lang="en-US" sz="900" dirty="0">
-                <a:latin typeface="Helvetica Neue"/>
-                <a:ea typeface="Verdana" pitchFamily="34" charset="0"/>
-                <a:cs typeface="Helvetica Neue"/>
-              </a:endParaRPr>
             </a:p>
           </p:txBody>
         </p:sp>
@@ -5838,21 +5850,8 @@
                   <a:ea typeface="Verdana" pitchFamily="34" charset="0"/>
                   <a:cs typeface="Helvetica Neue"/>
                 </a:rPr>
-                <a:t>VPC </a:t>
+                <a:t>VPC subnet</a:t>
               </a:r>
-              <a:r>
-                <a:rPr lang="en-US" sz="900" dirty="0" smtClean="0">
-                  <a:latin typeface="Helvetica Neue"/>
-                  <a:ea typeface="Verdana" pitchFamily="34" charset="0"/>
-                  <a:cs typeface="Helvetica Neue"/>
-                </a:rPr>
-                <a:t>subnet</a:t>
-              </a:r>
-              <a:endParaRPr lang="en-US" sz="900" dirty="0">
-                <a:latin typeface="Helvetica Neue"/>
-                <a:ea typeface="Verdana" pitchFamily="34" charset="0"/>
-                <a:cs typeface="Helvetica Neue"/>
-              </a:endParaRPr>
             </a:p>
           </p:txBody>
         </p:sp>
@@ -5949,7 +5948,7 @@
             <a:p>
               <a:pPr algn="ctr"/>
               <a:r>
-                <a:rPr lang="en-US" sz="1000" dirty="0" err="1" smtClean="0">
+                <a:rPr lang="en-US" sz="1000" dirty="0" err="1">
                   <a:latin typeface="Helvetica Neue"/>
                   <a:cs typeface="Helvetica Neue"/>
                 </a:rPr>
@@ -6017,7 +6016,7 @@
           <a:p>
             <a:pPr algn="ctr"/>
             <a:r>
-              <a:rPr lang="en-US" sz="1000" dirty="0" err="1" smtClean="0">
+              <a:rPr lang="en-US" sz="1000" dirty="0" err="1">
                 <a:latin typeface="Helvetica Neue"/>
                 <a:cs typeface="Helvetica Neue"/>
               </a:rPr>
@@ -6054,16 +6053,12 @@
           <a:p>
             <a:pPr algn="ctr"/>
             <a:r>
-              <a:rPr lang="en-US" sz="1000" dirty="0" smtClean="0">
+              <a:rPr lang="en-US" sz="1000" dirty="0">
                 <a:latin typeface="Helvetica Neue"/>
                 <a:cs typeface="Helvetica Neue"/>
               </a:rPr>
               <a:t>Direct Connect</a:t>
             </a:r>
-            <a:endParaRPr lang="en-US" sz="1000" dirty="0">
-              <a:latin typeface="Helvetica Neue"/>
-              <a:cs typeface="Helvetica Neue"/>
-            </a:endParaRPr>
           </a:p>
         </p:txBody>
       </p:sp>
@@ -6175,18 +6170,13 @@
             <a:p>
               <a:pPr algn="ctr"/>
               <a:r>
-                <a:rPr lang="en-US" sz="900" b="1" dirty="0" smtClean="0">
+                <a:rPr lang="en-US" sz="900" b="1" dirty="0">
                   <a:latin typeface="Helvetica Neue"/>
                   <a:ea typeface="Verdana" pitchFamily="34" charset="0"/>
                   <a:cs typeface="Helvetica Neue"/>
                 </a:rPr>
                 <a:t>Auto Scaling group</a:t>
               </a:r>
-              <a:endParaRPr lang="en-US" sz="900" b="1" dirty="0">
-                <a:latin typeface="Helvetica Neue"/>
-                <a:ea typeface="Verdana" pitchFamily="34" charset="0"/>
-                <a:cs typeface="Helvetica Neue"/>
-              </a:endParaRPr>
             </a:p>
           </p:txBody>
         </p:sp>
@@ -6299,18 +6289,13 @@
             <a:p>
               <a:pPr algn="ctr"/>
               <a:r>
-                <a:rPr lang="en-US" sz="900" dirty="0" smtClean="0">
+                <a:rPr lang="en-US" sz="900" dirty="0">
                   <a:latin typeface="Helvetica Neue"/>
                   <a:ea typeface="Verdana" pitchFamily="34" charset="0"/>
                   <a:cs typeface="Helvetica Neue"/>
                 </a:rPr>
                 <a:t>corporate data center</a:t>
               </a:r>
-              <a:endParaRPr lang="en-US" sz="900" dirty="0">
-                <a:latin typeface="Helvetica Neue"/>
-                <a:ea typeface="Verdana" pitchFamily="34" charset="0"/>
-                <a:cs typeface="Helvetica Neue"/>
-              </a:endParaRPr>
             </a:p>
           </p:txBody>
         </p:sp>
@@ -6399,16 +6384,12 @@
           <a:p>
             <a:pPr algn="ctr"/>
             <a:r>
-              <a:rPr lang="en-US" sz="1000" dirty="0" smtClean="0">
+              <a:rPr lang="en-US" sz="1000" dirty="0">
                 <a:latin typeface="Helvetica Neue"/>
                 <a:cs typeface="Helvetica Neue"/>
               </a:rPr>
               <a:t>HTTP Proxy</a:t>
             </a:r>
-            <a:endParaRPr lang="en-US" sz="1000" dirty="0">
-              <a:latin typeface="Helvetica Neue"/>
-              <a:cs typeface="Helvetica Neue"/>
-            </a:endParaRPr>
           </a:p>
         </p:txBody>
       </p:sp>
@@ -6485,6 +6466,1203 @@
     <p:extLst>
       <p:ext uri="{BB962C8B-B14F-4D97-AF65-F5344CB8AC3E}">
         <p14:creationId xmlns:p14="http://schemas.microsoft.com/office/powerpoint/2010/main" val="1924374846"/>
+      </p:ext>
+    </p:extLst>
+  </p:cSld>
+  <p:clrMapOvr>
+    <a:masterClrMapping/>
+  </p:clrMapOvr>
+</p:sld>
+</file>
+
+<file path=ppt/slides/slide4.xml><?xml version="1.0" encoding="utf-8"?>
+<p:sld xmlns:a="http://schemas.openxmlformats.org/drawingml/2006/main" xmlns:r="http://schemas.openxmlformats.org/officeDocument/2006/relationships" xmlns:p="http://schemas.openxmlformats.org/presentationml/2006/main">
+  <p:cSld>
+    <p:spTree>
+      <p:nvGrpSpPr>
+        <p:cNvPr id="1" name=""/>
+        <p:cNvGrpSpPr/>
+        <p:nvPr/>
+      </p:nvGrpSpPr>
+      <p:grpSpPr>
+        <a:xfrm>
+          <a:off x="0" y="0"/>
+          <a:ext cx="0" cy="0"/>
+          <a:chOff x="0" y="0"/>
+          <a:chExt cx="0" cy="0"/>
+        </a:xfrm>
+      </p:grpSpPr>
+      <p:sp>
+        <p:nvSpPr>
+          <p:cNvPr id="6" name="Rounded Rectangle 5"/>
+          <p:cNvSpPr/>
+          <p:nvPr/>
+        </p:nvSpPr>
+        <p:spPr>
+          <a:xfrm>
+            <a:off x="871870" y="1250857"/>
+            <a:ext cx="6204153" cy="4654528"/>
+          </a:xfrm>
+          <a:prstGeom prst="roundRect">
+            <a:avLst>
+              <a:gd name="adj" fmla="val 9818"/>
+            </a:avLst>
+          </a:prstGeom>
+          <a:noFill/>
+          <a:ln w="6350">
+            <a:solidFill>
+              <a:schemeClr val="tx1"/>
+            </a:solidFill>
+            <a:prstDash val="solid"/>
+          </a:ln>
+          <a:effectLst/>
+        </p:spPr>
+        <p:style>
+          <a:lnRef idx="1">
+            <a:schemeClr val="accent1"/>
+          </a:lnRef>
+          <a:fillRef idx="3">
+            <a:schemeClr val="accent1"/>
+          </a:fillRef>
+          <a:effectRef idx="2">
+            <a:schemeClr val="accent1"/>
+          </a:effectRef>
+          <a:fontRef idx="minor">
+            <a:schemeClr val="lt1"/>
+          </a:fontRef>
+        </p:style>
+        <p:txBody>
+          <a:bodyPr anchor="ctr"/>
+          <a:lstStyle/>
+          <a:p>
+            <a:pPr algn="ctr" fontAlgn="auto">
+              <a:spcBef>
+                <a:spcPts val="0"/>
+              </a:spcBef>
+              <a:spcAft>
+                <a:spcPts val="0"/>
+              </a:spcAft>
+              <a:defRPr/>
+            </a:pPr>
+            <a:endParaRPr lang="en-US" dirty="0">
+              <a:solidFill>
+                <a:schemeClr val="tx1"/>
+              </a:solidFill>
+              <a:latin typeface="Arial"/>
+              <a:cs typeface="Arial"/>
+            </a:endParaRPr>
+          </a:p>
+        </p:txBody>
+      </p:sp>
+      <p:sp>
+        <p:nvSpPr>
+          <p:cNvPr id="7" name="TextBox 35"/>
+          <p:cNvSpPr txBox="1">
+            <a:spLocks noChangeArrowheads="1"/>
+          </p:cNvSpPr>
+          <p:nvPr/>
+        </p:nvSpPr>
+        <p:spPr bwMode="auto">
+          <a:xfrm>
+            <a:off x="2081870" y="5674553"/>
+            <a:ext cx="4690094" cy="230832"/>
+          </a:xfrm>
+          <a:prstGeom prst="rect">
+            <a:avLst/>
+          </a:prstGeom>
+          <a:noFill/>
+          <a:ln w="9525">
+            <a:noFill/>
+            <a:miter lim="800000"/>
+            <a:headEnd/>
+            <a:tailEnd/>
+          </a:ln>
+        </p:spPr>
+        <p:txBody>
+          <a:bodyPr wrap="square">
+            <a:spAutoFit/>
+          </a:bodyPr>
+          <a:lstStyle/>
+          <a:p>
+            <a:pPr algn="ctr"/>
+            <a:r>
+              <a:rPr lang="en-US" sz="900" dirty="0">
+                <a:latin typeface="Helvetica Neue"/>
+                <a:ea typeface="Verdana" pitchFamily="34" charset="0"/>
+                <a:cs typeface="Helvetica Neue"/>
+              </a:rPr>
+              <a:t>virtual private cloud</a:t>
+            </a:r>
+          </a:p>
+        </p:txBody>
+      </p:sp>
+      <p:pic>
+        <p:nvPicPr>
+          <p:cNvPr id="8" name="Picture 7" descr="VPC-Cloud.png"/>
+          <p:cNvPicPr>
+            <a:picLocks noChangeAspect="1"/>
+          </p:cNvPicPr>
+          <p:nvPr/>
+        </p:nvPicPr>
+        <p:blipFill>
+          <a:blip r:embed="rId3">
+            <a:extLst>
+              <a:ext uri="{28A0092B-C50C-407E-A947-70E740481C1C}">
+                <a14:useLocalDpi xmlns:a14="http://schemas.microsoft.com/office/drawing/2010/main" val="0"/>
+              </a:ext>
+            </a:extLst>
+          </a:blip>
+          <a:stretch>
+            <a:fillRect/>
+          </a:stretch>
+        </p:blipFill>
+        <p:spPr>
+          <a:xfrm>
+            <a:off x="2211015" y="708482"/>
+            <a:ext cx="896963" cy="853819"/>
+          </a:xfrm>
+          <a:prstGeom prst="rect">
+            <a:avLst/>
+          </a:prstGeom>
+        </p:spPr>
+      </p:pic>
+      <p:sp>
+        <p:nvSpPr>
+          <p:cNvPr id="17" name="TextBox 32"/>
+          <p:cNvSpPr txBox="1">
+            <a:spLocks noChangeArrowheads="1"/>
+          </p:cNvSpPr>
+          <p:nvPr/>
+        </p:nvSpPr>
+        <p:spPr bwMode="auto">
+          <a:xfrm>
+            <a:off x="3658515" y="5444365"/>
+            <a:ext cx="1557338" cy="230188"/>
+          </a:xfrm>
+          <a:prstGeom prst="rect">
+            <a:avLst/>
+          </a:prstGeom>
+          <a:noFill/>
+          <a:ln w="9525">
+            <a:noFill/>
+            <a:miter lim="800000"/>
+            <a:headEnd/>
+            <a:tailEnd/>
+          </a:ln>
+        </p:spPr>
+        <p:txBody>
+          <a:bodyPr>
+            <a:spAutoFit/>
+          </a:bodyPr>
+          <a:lstStyle/>
+          <a:p>
+            <a:pPr algn="ctr"/>
+            <a:r>
+              <a:rPr lang="en-US" sz="900" b="1" dirty="0">
+                <a:solidFill>
+                  <a:srgbClr val="F7981F"/>
+                </a:solidFill>
+                <a:latin typeface="Helvetica Neue"/>
+                <a:ea typeface="Verdana" pitchFamily="34" charset="0"/>
+                <a:cs typeface="Helvetica Neue"/>
+              </a:rPr>
+              <a:t>Availability Zone</a:t>
+            </a:r>
+          </a:p>
+        </p:txBody>
+      </p:sp>
+      <p:sp>
+        <p:nvSpPr>
+          <p:cNvPr id="19" name="Rounded Rectangle 18"/>
+          <p:cNvSpPr/>
+          <p:nvPr/>
+        </p:nvSpPr>
+        <p:spPr>
+          <a:xfrm>
+            <a:off x="2322088" y="1562301"/>
+            <a:ext cx="4464501" cy="4112252"/>
+          </a:xfrm>
+          <a:prstGeom prst="roundRect">
+            <a:avLst>
+              <a:gd name="adj" fmla="val 9818"/>
+            </a:avLst>
+          </a:prstGeom>
+          <a:noFill/>
+          <a:ln w="19050">
+            <a:solidFill>
+              <a:srgbClr val="F7981F"/>
+            </a:solidFill>
+            <a:prstDash val="lgDash"/>
+          </a:ln>
+          <a:effectLst/>
+        </p:spPr>
+        <p:style>
+          <a:lnRef idx="1">
+            <a:schemeClr val="accent1"/>
+          </a:lnRef>
+          <a:fillRef idx="3">
+            <a:schemeClr val="accent1"/>
+          </a:fillRef>
+          <a:effectRef idx="2">
+            <a:schemeClr val="accent1"/>
+          </a:effectRef>
+          <a:fontRef idx="minor">
+            <a:schemeClr val="lt1"/>
+          </a:fontRef>
+        </p:style>
+        <p:txBody>
+          <a:bodyPr anchor="ctr"/>
+          <a:lstStyle/>
+          <a:p>
+            <a:pPr algn="ctr" fontAlgn="auto">
+              <a:spcBef>
+                <a:spcPts val="0"/>
+              </a:spcBef>
+              <a:spcAft>
+                <a:spcPts val="0"/>
+              </a:spcAft>
+              <a:defRPr/>
+            </a:pPr>
+            <a:endParaRPr lang="en-US" dirty="0">
+              <a:solidFill>
+                <a:schemeClr val="tx1"/>
+              </a:solidFill>
+              <a:latin typeface="Helvetica Neue"/>
+              <a:cs typeface="Helvetica Neue"/>
+            </a:endParaRPr>
+          </a:p>
+        </p:txBody>
+      </p:sp>
+      <p:grpSp>
+        <p:nvGrpSpPr>
+          <p:cNvPr id="22" name="Group 21"/>
+          <p:cNvGrpSpPr/>
+          <p:nvPr/>
+        </p:nvGrpSpPr>
+        <p:grpSpPr>
+          <a:xfrm>
+            <a:off x="2606092" y="1798008"/>
+            <a:ext cx="1419808" cy="3910856"/>
+            <a:chOff x="4629150" y="2824163"/>
+            <a:chExt cx="1752600" cy="1859298"/>
+          </a:xfrm>
+        </p:grpSpPr>
+        <p:sp>
+          <p:nvSpPr>
+            <p:cNvPr id="23" name="Rounded Rectangle 22"/>
+            <p:cNvSpPr/>
+            <p:nvPr/>
+          </p:nvSpPr>
+          <p:spPr>
+            <a:xfrm>
+              <a:off x="4629150" y="2824163"/>
+              <a:ext cx="1752600" cy="1733550"/>
+            </a:xfrm>
+            <a:prstGeom prst="roundRect">
+              <a:avLst>
+                <a:gd name="adj" fmla="val 9818"/>
+              </a:avLst>
+            </a:prstGeom>
+            <a:noFill/>
+            <a:ln w="6350">
+              <a:solidFill>
+                <a:schemeClr val="tx1"/>
+              </a:solidFill>
+              <a:prstDash val="solid"/>
+            </a:ln>
+            <a:effectLst/>
+          </p:spPr>
+          <p:style>
+            <a:lnRef idx="1">
+              <a:schemeClr val="accent1"/>
+            </a:lnRef>
+            <a:fillRef idx="3">
+              <a:schemeClr val="accent1"/>
+            </a:fillRef>
+            <a:effectRef idx="2">
+              <a:schemeClr val="accent1"/>
+            </a:effectRef>
+            <a:fontRef idx="minor">
+              <a:schemeClr val="lt1"/>
+            </a:fontRef>
+          </p:style>
+          <p:txBody>
+            <a:bodyPr anchor="ctr"/>
+            <a:lstStyle/>
+            <a:p>
+              <a:pPr algn="ctr" fontAlgn="auto">
+                <a:spcBef>
+                  <a:spcPts val="0"/>
+                </a:spcBef>
+                <a:spcAft>
+                  <a:spcPts val="0"/>
+                </a:spcAft>
+                <a:defRPr/>
+              </a:pPr>
+              <a:endParaRPr lang="en-US" dirty="0">
+                <a:solidFill>
+                  <a:schemeClr val="tx1"/>
+                </a:solidFill>
+                <a:latin typeface="Helvetica Neue"/>
+                <a:cs typeface="Helvetica Neue"/>
+              </a:endParaRPr>
+            </a:p>
+          </p:txBody>
+        </p:sp>
+        <p:sp>
+          <p:nvSpPr>
+            <p:cNvPr id="24" name="TextBox 37"/>
+            <p:cNvSpPr txBox="1">
+              <a:spLocks noChangeArrowheads="1"/>
+            </p:cNvSpPr>
+            <p:nvPr/>
+          </p:nvSpPr>
+          <p:spPr bwMode="auto">
+            <a:xfrm>
+              <a:off x="4670321" y="4451686"/>
+              <a:ext cx="1555750" cy="231775"/>
+            </a:xfrm>
+            <a:prstGeom prst="rect">
+              <a:avLst/>
+            </a:prstGeom>
+            <a:noFill/>
+            <a:ln w="9525">
+              <a:noFill/>
+              <a:miter lim="800000"/>
+              <a:headEnd/>
+              <a:tailEnd/>
+            </a:ln>
+          </p:spPr>
+          <p:txBody>
+            <a:bodyPr>
+              <a:spAutoFit/>
+            </a:bodyPr>
+            <a:lstStyle/>
+            <a:p>
+              <a:pPr algn="ctr"/>
+              <a:r>
+                <a:rPr lang="en-US" sz="900" dirty="0">
+                  <a:latin typeface="Helvetica Neue"/>
+                  <a:ea typeface="Verdana" pitchFamily="34" charset="0"/>
+                  <a:cs typeface="Helvetica Neue"/>
+                </a:rPr>
+                <a:t>VPC subnet</a:t>
+              </a:r>
+            </a:p>
+          </p:txBody>
+        </p:sp>
+      </p:grpSp>
+      <p:pic>
+        <p:nvPicPr>
+          <p:cNvPr id="25" name="Picture 24"/>
+          <p:cNvPicPr>
+            <a:picLocks noChangeAspect="1"/>
+          </p:cNvPicPr>
+          <p:nvPr/>
+        </p:nvPicPr>
+        <p:blipFill>
+          <a:blip r:embed="rId4"/>
+          <a:stretch>
+            <a:fillRect/>
+          </a:stretch>
+        </p:blipFill>
+        <p:spPr>
+          <a:xfrm>
+            <a:off x="2979478" y="1621400"/>
+            <a:ext cx="257000" cy="287235"/>
+          </a:xfrm>
+          <a:prstGeom prst="rect">
+            <a:avLst/>
+          </a:prstGeom>
+        </p:spPr>
+      </p:pic>
+      <p:sp>
+        <p:nvSpPr>
+          <p:cNvPr id="28" name="TextBox 27"/>
+          <p:cNvSpPr txBox="1"/>
+          <p:nvPr/>
+        </p:nvSpPr>
+        <p:spPr>
+          <a:xfrm>
+            <a:off x="2842997" y="3639739"/>
+            <a:ext cx="975109" cy="153888"/>
+          </a:xfrm>
+          <a:prstGeom prst="rect">
+            <a:avLst/>
+          </a:prstGeom>
+          <a:noFill/>
+        </p:spPr>
+        <p:txBody>
+          <a:bodyPr wrap="square" lIns="0" tIns="0" rIns="0" bIns="0" rtlCol="0">
+            <a:spAutoFit/>
+          </a:bodyPr>
+          <a:lstStyle/>
+          <a:p>
+            <a:pPr algn="ctr"/>
+            <a:r>
+              <a:rPr lang="en-US" sz="1000" dirty="0" err="1">
+                <a:latin typeface="Helvetica Neue"/>
+                <a:cs typeface="Helvetica Neue"/>
+              </a:rPr>
+              <a:t>MasterServer</a:t>
+            </a:r>
+            <a:endParaRPr lang="en-US" sz="1000" dirty="0">
+              <a:latin typeface="Helvetica Neue"/>
+              <a:cs typeface="Helvetica Neue"/>
+            </a:endParaRPr>
+          </a:p>
+        </p:txBody>
+      </p:sp>
+      <p:pic>
+        <p:nvPicPr>
+          <p:cNvPr id="30" name="Picture 29" descr="EC2-Instances.png"/>
+          <p:cNvPicPr>
+            <a:picLocks noChangeAspect="1"/>
+          </p:cNvPicPr>
+          <p:nvPr/>
+        </p:nvPicPr>
+        <p:blipFill>
+          <a:blip r:embed="rId5">
+            <a:extLst>
+              <a:ext uri="{28A0092B-C50C-407E-A947-70E740481C1C}">
+                <a14:useLocalDpi xmlns:a14="http://schemas.microsoft.com/office/drawing/2010/main" val="0"/>
+              </a:ext>
+            </a:extLst>
+          </a:blip>
+          <a:stretch>
+            <a:fillRect/>
+          </a:stretch>
+        </p:blipFill>
+        <p:spPr>
+          <a:xfrm>
+            <a:off x="5228816" y="2940258"/>
+            <a:ext cx="731520" cy="731520"/>
+          </a:xfrm>
+          <a:prstGeom prst="rect">
+            <a:avLst/>
+          </a:prstGeom>
+        </p:spPr>
+      </p:pic>
+      <p:sp>
+        <p:nvSpPr>
+          <p:cNvPr id="31" name="TextBox 30"/>
+          <p:cNvSpPr txBox="1"/>
+          <p:nvPr/>
+        </p:nvSpPr>
+        <p:spPr>
+          <a:xfrm>
+            <a:off x="5038080" y="3738708"/>
+            <a:ext cx="1112993" cy="153888"/>
+          </a:xfrm>
+          <a:prstGeom prst="rect">
+            <a:avLst/>
+          </a:prstGeom>
+          <a:noFill/>
+        </p:spPr>
+        <p:txBody>
+          <a:bodyPr wrap="square" lIns="0" tIns="0" rIns="0" bIns="0" rtlCol="0">
+            <a:spAutoFit/>
+          </a:bodyPr>
+          <a:lstStyle/>
+          <a:p>
+            <a:pPr algn="ctr"/>
+            <a:r>
+              <a:rPr lang="en-US" sz="1000" dirty="0" err="1">
+                <a:latin typeface="Helvetica Neue"/>
+                <a:cs typeface="Helvetica Neue"/>
+              </a:rPr>
+              <a:t>ComputeFleet</a:t>
+            </a:r>
+            <a:endParaRPr lang="en-US" sz="1000" dirty="0">
+              <a:latin typeface="Helvetica Neue"/>
+              <a:cs typeface="Helvetica Neue"/>
+            </a:endParaRPr>
+          </a:p>
+        </p:txBody>
+      </p:sp>
+      <p:sp>
+        <p:nvSpPr>
+          <p:cNvPr id="32" name="TextBox 31"/>
+          <p:cNvSpPr txBox="1"/>
+          <p:nvPr/>
+        </p:nvSpPr>
+        <p:spPr>
+          <a:xfrm>
+            <a:off x="790342" y="3738708"/>
+            <a:ext cx="520739" cy="153888"/>
+          </a:xfrm>
+          <a:prstGeom prst="rect">
+            <a:avLst/>
+          </a:prstGeom>
+          <a:noFill/>
+        </p:spPr>
+        <p:txBody>
+          <a:bodyPr wrap="square" lIns="0" tIns="0" rIns="0" bIns="0" rtlCol="0">
+            <a:spAutoFit/>
+          </a:bodyPr>
+          <a:lstStyle/>
+          <a:p>
+            <a:pPr algn="ctr"/>
+            <a:r>
+              <a:rPr lang="en-US" sz="1000" dirty="0">
+                <a:latin typeface="Helvetica Neue"/>
+                <a:cs typeface="Helvetica Neue"/>
+              </a:rPr>
+              <a:t>IGW</a:t>
+            </a:r>
+          </a:p>
+        </p:txBody>
+      </p:sp>
+      <p:grpSp>
+        <p:nvGrpSpPr>
+          <p:cNvPr id="33" name="Group 32"/>
+          <p:cNvGrpSpPr/>
+          <p:nvPr/>
+        </p:nvGrpSpPr>
+        <p:grpSpPr>
+          <a:xfrm>
+            <a:off x="4755642" y="2772964"/>
+            <a:ext cx="1662236" cy="1465236"/>
+            <a:chOff x="388010" y="760413"/>
+            <a:chExt cx="1876229" cy="1740234"/>
+          </a:xfrm>
+        </p:grpSpPr>
+        <p:sp>
+          <p:nvSpPr>
+            <p:cNvPr id="34" name="Rounded Rectangle 33"/>
+            <p:cNvSpPr/>
+            <p:nvPr/>
+          </p:nvSpPr>
+          <p:spPr>
+            <a:xfrm>
+              <a:off x="463550" y="760413"/>
+              <a:ext cx="1709738" cy="1733550"/>
+            </a:xfrm>
+            <a:prstGeom prst="roundRect">
+              <a:avLst>
+                <a:gd name="adj" fmla="val 9818"/>
+              </a:avLst>
+            </a:prstGeom>
+            <a:noFill/>
+            <a:ln w="19050">
+              <a:solidFill>
+                <a:schemeClr val="tx1"/>
+              </a:solidFill>
+              <a:prstDash val="lgDashDot"/>
+            </a:ln>
+            <a:effectLst/>
+          </p:spPr>
+          <p:style>
+            <a:lnRef idx="1">
+              <a:schemeClr val="accent1"/>
+            </a:lnRef>
+            <a:fillRef idx="3">
+              <a:schemeClr val="accent1"/>
+            </a:fillRef>
+            <a:effectRef idx="2">
+              <a:schemeClr val="accent1"/>
+            </a:effectRef>
+            <a:fontRef idx="minor">
+              <a:schemeClr val="lt1"/>
+            </a:fontRef>
+          </p:style>
+          <p:txBody>
+            <a:bodyPr anchor="ctr"/>
+            <a:lstStyle/>
+            <a:p>
+              <a:pPr algn="ctr" fontAlgn="auto">
+                <a:spcBef>
+                  <a:spcPts val="0"/>
+                </a:spcBef>
+                <a:spcAft>
+                  <a:spcPts val="0"/>
+                </a:spcAft>
+                <a:defRPr/>
+              </a:pPr>
+              <a:endParaRPr lang="en-US" dirty="0">
+                <a:solidFill>
+                  <a:schemeClr val="tx1"/>
+                </a:solidFill>
+                <a:latin typeface="Helvetica Neue"/>
+                <a:cs typeface="Helvetica Neue"/>
+              </a:endParaRPr>
+            </a:p>
+          </p:txBody>
+        </p:sp>
+        <p:sp>
+          <p:nvSpPr>
+            <p:cNvPr id="35" name="TextBox 31"/>
+            <p:cNvSpPr txBox="1">
+              <a:spLocks noChangeArrowheads="1"/>
+            </p:cNvSpPr>
+            <p:nvPr/>
+          </p:nvSpPr>
+          <p:spPr bwMode="auto">
+            <a:xfrm>
+              <a:off x="388010" y="2226492"/>
+              <a:ext cx="1876229" cy="274155"/>
+            </a:xfrm>
+            <a:prstGeom prst="rect">
+              <a:avLst/>
+            </a:prstGeom>
+            <a:noFill/>
+            <a:ln w="9525">
+              <a:noFill/>
+              <a:miter lim="800000"/>
+              <a:headEnd/>
+              <a:tailEnd/>
+            </a:ln>
+          </p:spPr>
+          <p:txBody>
+            <a:bodyPr wrap="square">
+              <a:spAutoFit/>
+            </a:bodyPr>
+            <a:lstStyle/>
+            <a:p>
+              <a:pPr algn="ctr"/>
+              <a:r>
+                <a:rPr lang="en-US" sz="900" b="1" dirty="0">
+                  <a:latin typeface="Helvetica Neue"/>
+                  <a:ea typeface="Verdana" pitchFamily="34" charset="0"/>
+                  <a:cs typeface="Helvetica Neue"/>
+                </a:rPr>
+                <a:t>ECS Container Instances</a:t>
+              </a:r>
+            </a:p>
+          </p:txBody>
+        </p:sp>
+      </p:grpSp>
+      <p:grpSp>
+        <p:nvGrpSpPr>
+          <p:cNvPr id="36" name="Group 35"/>
+          <p:cNvGrpSpPr/>
+          <p:nvPr/>
+        </p:nvGrpSpPr>
+        <p:grpSpPr>
+          <a:xfrm>
+            <a:off x="4320592" y="1772608"/>
+            <a:ext cx="2181808" cy="3910856"/>
+            <a:chOff x="4629150" y="2824163"/>
+            <a:chExt cx="1752600" cy="1859298"/>
+          </a:xfrm>
+        </p:grpSpPr>
+        <p:sp>
+          <p:nvSpPr>
+            <p:cNvPr id="37" name="Rounded Rectangle 36"/>
+            <p:cNvSpPr/>
+            <p:nvPr/>
+          </p:nvSpPr>
+          <p:spPr>
+            <a:xfrm>
+              <a:off x="4629150" y="2824163"/>
+              <a:ext cx="1752600" cy="1733550"/>
+            </a:xfrm>
+            <a:prstGeom prst="roundRect">
+              <a:avLst>
+                <a:gd name="adj" fmla="val 9818"/>
+              </a:avLst>
+            </a:prstGeom>
+            <a:noFill/>
+            <a:ln w="6350">
+              <a:solidFill>
+                <a:schemeClr val="tx1"/>
+              </a:solidFill>
+              <a:prstDash val="solid"/>
+            </a:ln>
+            <a:effectLst/>
+          </p:spPr>
+          <p:style>
+            <a:lnRef idx="1">
+              <a:schemeClr val="accent1"/>
+            </a:lnRef>
+            <a:fillRef idx="3">
+              <a:schemeClr val="accent1"/>
+            </a:fillRef>
+            <a:effectRef idx="2">
+              <a:schemeClr val="accent1"/>
+            </a:effectRef>
+            <a:fontRef idx="minor">
+              <a:schemeClr val="lt1"/>
+            </a:fontRef>
+          </p:style>
+          <p:txBody>
+            <a:bodyPr anchor="ctr"/>
+            <a:lstStyle/>
+            <a:p>
+              <a:pPr algn="ctr" fontAlgn="auto">
+                <a:spcBef>
+                  <a:spcPts val="0"/>
+                </a:spcBef>
+                <a:spcAft>
+                  <a:spcPts val="0"/>
+                </a:spcAft>
+                <a:defRPr/>
+              </a:pPr>
+              <a:endParaRPr lang="en-US" dirty="0">
+                <a:solidFill>
+                  <a:schemeClr val="tx1"/>
+                </a:solidFill>
+                <a:latin typeface="Helvetica Neue"/>
+                <a:cs typeface="Helvetica Neue"/>
+              </a:endParaRPr>
+            </a:p>
+          </p:txBody>
+        </p:sp>
+        <p:sp>
+          <p:nvSpPr>
+            <p:cNvPr id="38" name="TextBox 37"/>
+            <p:cNvSpPr txBox="1">
+              <a:spLocks noChangeArrowheads="1"/>
+            </p:cNvSpPr>
+            <p:nvPr/>
+          </p:nvSpPr>
+          <p:spPr bwMode="auto">
+            <a:xfrm>
+              <a:off x="4670321" y="4451686"/>
+              <a:ext cx="1555750" cy="231775"/>
+            </a:xfrm>
+            <a:prstGeom prst="rect">
+              <a:avLst/>
+            </a:prstGeom>
+            <a:noFill/>
+            <a:ln w="9525">
+              <a:noFill/>
+              <a:miter lim="800000"/>
+              <a:headEnd/>
+              <a:tailEnd/>
+            </a:ln>
+          </p:spPr>
+          <p:txBody>
+            <a:bodyPr>
+              <a:spAutoFit/>
+            </a:bodyPr>
+            <a:lstStyle/>
+            <a:p>
+              <a:pPr algn="ctr"/>
+              <a:r>
+                <a:rPr lang="en-US" sz="900" dirty="0">
+                  <a:latin typeface="Helvetica Neue"/>
+                  <a:ea typeface="Verdana" pitchFamily="34" charset="0"/>
+                  <a:cs typeface="Helvetica Neue"/>
+                </a:rPr>
+                <a:t>VPC subnet</a:t>
+              </a:r>
+            </a:p>
+          </p:txBody>
+        </p:sp>
+      </p:grpSp>
+      <p:pic>
+        <p:nvPicPr>
+          <p:cNvPr id="39" name="Picture 38"/>
+          <p:cNvPicPr>
+            <a:picLocks noChangeAspect="1"/>
+          </p:cNvPicPr>
+          <p:nvPr/>
+        </p:nvPicPr>
+        <p:blipFill>
+          <a:blip r:embed="rId4"/>
+          <a:stretch>
+            <a:fillRect/>
+          </a:stretch>
+        </p:blipFill>
+        <p:spPr>
+          <a:xfrm>
+            <a:off x="4694066" y="1621400"/>
+            <a:ext cx="257000" cy="287235"/>
+          </a:xfrm>
+          <a:prstGeom prst="rect">
+            <a:avLst/>
+          </a:prstGeom>
+        </p:spPr>
+      </p:pic>
+      <p:pic>
+        <p:nvPicPr>
+          <p:cNvPr id="40" name="Picture 39">
+            <a:extLst>
+              <a:ext uri="{FF2B5EF4-FFF2-40B4-BE49-F238E27FC236}">
+                <a16:creationId xmlns:a16="http://schemas.microsoft.com/office/drawing/2014/main" id="{D1CE7062-A260-9C46-A782-518F4D1ACFD5}"/>
+              </a:ext>
+            </a:extLst>
+          </p:cNvPr>
+          <p:cNvPicPr>
+            <a:picLocks noChangeAspect="1"/>
+          </p:cNvPicPr>
+          <p:nvPr/>
+        </p:nvPicPr>
+        <p:blipFill>
+          <a:blip r:embed="rId6">
+            <a:extLst>
+              <a:ext uri="{28A0092B-C50C-407E-A947-70E740481C1C}">
+                <a14:useLocalDpi xmlns:a14="http://schemas.microsoft.com/office/drawing/2010/main" val="0"/>
+              </a:ext>
+            </a:extLst>
+          </a:blip>
+          <a:stretch>
+            <a:fillRect/>
+          </a:stretch>
+        </p:blipFill>
+        <p:spPr>
+          <a:xfrm>
+            <a:off x="3061453" y="4258471"/>
+            <a:ext cx="538195" cy="555557"/>
+          </a:xfrm>
+          <a:prstGeom prst="rect">
+            <a:avLst/>
+          </a:prstGeom>
+        </p:spPr>
+      </p:pic>
+      <p:pic>
+        <p:nvPicPr>
+          <p:cNvPr id="41" name="Picture 40">
+            <a:extLst>
+              <a:ext uri="{FF2B5EF4-FFF2-40B4-BE49-F238E27FC236}">
+                <a16:creationId xmlns:a16="http://schemas.microsoft.com/office/drawing/2014/main" id="{67C589DD-A941-5548-9A5D-F5DB5283A1F1}"/>
+              </a:ext>
+            </a:extLst>
+          </p:cNvPr>
+          <p:cNvPicPr>
+            <a:picLocks noChangeAspect="1"/>
+          </p:cNvPicPr>
+          <p:nvPr/>
+        </p:nvPicPr>
+        <p:blipFill>
+          <a:blip r:embed="rId7">
+            <a:extLst>
+              <a:ext uri="{28A0092B-C50C-407E-A947-70E740481C1C}">
+                <a14:useLocalDpi xmlns:a14="http://schemas.microsoft.com/office/drawing/2010/main" val="0"/>
+              </a:ext>
+            </a:extLst>
+          </a:blip>
+          <a:stretch>
+            <a:fillRect/>
+          </a:stretch>
+        </p:blipFill>
+        <p:spPr>
+          <a:xfrm>
+            <a:off x="1406928" y="3167773"/>
+            <a:ext cx="538196" cy="564237"/>
+          </a:xfrm>
+          <a:prstGeom prst="rect">
+            <a:avLst/>
+          </a:prstGeom>
+        </p:spPr>
+      </p:pic>
+      <p:sp>
+        <p:nvSpPr>
+          <p:cNvPr id="42" name="TextBox 41">
+            <a:extLst>
+              <a:ext uri="{FF2B5EF4-FFF2-40B4-BE49-F238E27FC236}">
+                <a16:creationId xmlns:a16="http://schemas.microsoft.com/office/drawing/2014/main" id="{D9A86588-B759-0E4E-8DA7-658F7F782281}"/>
+              </a:ext>
+            </a:extLst>
+          </p:cNvPr>
+          <p:cNvSpPr txBox="1"/>
+          <p:nvPr/>
+        </p:nvSpPr>
+        <p:spPr>
+          <a:xfrm>
+            <a:off x="1745812" y="3684954"/>
+            <a:ext cx="520739" cy="153888"/>
+          </a:xfrm>
+          <a:prstGeom prst="rect">
+            <a:avLst/>
+          </a:prstGeom>
+          <a:noFill/>
+        </p:spPr>
+        <p:txBody>
+          <a:bodyPr wrap="square" lIns="0" tIns="0" rIns="0" bIns="0" rtlCol="0">
+            <a:spAutoFit/>
+          </a:bodyPr>
+          <a:lstStyle/>
+          <a:p>
+            <a:pPr algn="ctr"/>
+            <a:r>
+              <a:rPr lang="en-US" sz="1000" dirty="0">
+                <a:latin typeface="Helvetica Neue"/>
+                <a:cs typeface="Helvetica Neue"/>
+              </a:rPr>
+              <a:t>Router</a:t>
+            </a:r>
+          </a:p>
+        </p:txBody>
+      </p:sp>
+      <p:pic>
+        <p:nvPicPr>
+          <p:cNvPr id="45" name="Picture 44">
+            <a:extLst>
+              <a:ext uri="{FF2B5EF4-FFF2-40B4-BE49-F238E27FC236}">
+                <a16:creationId xmlns:a16="http://schemas.microsoft.com/office/drawing/2014/main" id="{04E94FC7-ED14-0A41-A44D-A6A21ABA3064}"/>
+              </a:ext>
+            </a:extLst>
+          </p:cNvPr>
+          <p:cNvPicPr>
+            <a:picLocks noChangeAspect="1"/>
+          </p:cNvPicPr>
+          <p:nvPr/>
+        </p:nvPicPr>
+        <p:blipFill>
+          <a:blip r:embed="rId8">
+            <a:extLst>
+              <a:ext uri="{28A0092B-C50C-407E-A947-70E740481C1C}">
+                <a14:useLocalDpi xmlns:a14="http://schemas.microsoft.com/office/drawing/2010/main" val="0"/>
+              </a:ext>
+            </a:extLst>
+          </a:blip>
+          <a:stretch>
+            <a:fillRect/>
+          </a:stretch>
+        </p:blipFill>
+        <p:spPr>
+          <a:xfrm>
+            <a:off x="3040420" y="3020236"/>
+            <a:ext cx="551151" cy="571564"/>
+          </a:xfrm>
+          <a:prstGeom prst="rect">
+            <a:avLst/>
+          </a:prstGeom>
+        </p:spPr>
+      </p:pic>
+      <p:cxnSp>
+        <p:nvCxnSpPr>
+          <p:cNvPr id="10" name="Elbow Connector 9">
+            <a:extLst>
+              <a:ext uri="{FF2B5EF4-FFF2-40B4-BE49-F238E27FC236}">
+                <a16:creationId xmlns:a16="http://schemas.microsoft.com/office/drawing/2014/main" id="{5045127D-822D-EF4E-9A5E-9319F281F49B}"/>
+              </a:ext>
+            </a:extLst>
+          </p:cNvPr>
+          <p:cNvCxnSpPr>
+            <a:cxnSpLocks/>
+            <a:stCxn id="45" idx="1"/>
+            <a:endCxn id="41" idx="3"/>
+          </p:cNvCxnSpPr>
+          <p:nvPr/>
+        </p:nvCxnSpPr>
+        <p:spPr>
+          <a:xfrm rot="10800000" flipV="1">
+            <a:off x="1945124" y="3306018"/>
+            <a:ext cx="1095296" cy="143874"/>
+          </a:xfrm>
+          <a:prstGeom prst="bentConnector3">
+            <a:avLst/>
+          </a:prstGeom>
+        </p:spPr>
+        <p:style>
+          <a:lnRef idx="2">
+            <a:schemeClr val="accent1"/>
+          </a:lnRef>
+          <a:fillRef idx="0">
+            <a:schemeClr val="accent1"/>
+          </a:fillRef>
+          <a:effectRef idx="1">
+            <a:schemeClr val="accent1"/>
+          </a:effectRef>
+          <a:fontRef idx="minor">
+            <a:schemeClr val="tx1"/>
+          </a:fontRef>
+        </p:style>
+      </p:cxnSp>
+      <p:cxnSp>
+        <p:nvCxnSpPr>
+          <p:cNvPr id="14" name="Elbow Connector 13">
+            <a:extLst>
+              <a:ext uri="{FF2B5EF4-FFF2-40B4-BE49-F238E27FC236}">
+                <a16:creationId xmlns:a16="http://schemas.microsoft.com/office/drawing/2014/main" id="{4A022612-25B8-144E-98AF-5FD4E36309DF}"/>
+              </a:ext>
+            </a:extLst>
+          </p:cNvPr>
+          <p:cNvCxnSpPr>
+            <a:cxnSpLocks/>
+            <a:stCxn id="40" idx="1"/>
+            <a:endCxn id="41" idx="2"/>
+          </p:cNvCxnSpPr>
+          <p:nvPr/>
+        </p:nvCxnSpPr>
+        <p:spPr>
+          <a:xfrm rot="10800000">
+            <a:off x="1676027" y="3732010"/>
+            <a:ext cx="1385427" cy="804240"/>
+          </a:xfrm>
+          <a:prstGeom prst="bentConnector2">
+            <a:avLst/>
+          </a:prstGeom>
+        </p:spPr>
+        <p:style>
+          <a:lnRef idx="2">
+            <a:schemeClr val="accent1"/>
+          </a:lnRef>
+          <a:fillRef idx="0">
+            <a:schemeClr val="accent1"/>
+          </a:fillRef>
+          <a:effectRef idx="1">
+            <a:schemeClr val="accent1"/>
+          </a:effectRef>
+          <a:fontRef idx="minor">
+            <a:schemeClr val="tx1"/>
+          </a:fontRef>
+        </p:style>
+      </p:cxnSp>
+      <p:pic>
+        <p:nvPicPr>
+          <p:cNvPr id="46" name="Picture 45">
+            <a:extLst>
+              <a:ext uri="{FF2B5EF4-FFF2-40B4-BE49-F238E27FC236}">
+                <a16:creationId xmlns:a16="http://schemas.microsoft.com/office/drawing/2014/main" id="{8E92904A-58D0-734C-8BA4-AB8BF097FC1F}"/>
+              </a:ext>
+            </a:extLst>
+          </p:cNvPr>
+          <p:cNvPicPr>
+            <a:picLocks noChangeAspect="1"/>
+          </p:cNvPicPr>
+          <p:nvPr/>
+        </p:nvPicPr>
+        <p:blipFill>
+          <a:blip r:embed="rId9">
+            <a:extLst>
+              <a:ext uri="{28A0092B-C50C-407E-A947-70E740481C1C}">
+                <a14:useLocalDpi xmlns:a14="http://schemas.microsoft.com/office/drawing/2010/main" val="0"/>
+              </a:ext>
+            </a:extLst>
+          </a:blip>
+          <a:stretch>
+            <a:fillRect/>
+          </a:stretch>
+        </p:blipFill>
+        <p:spPr>
+          <a:xfrm>
+            <a:off x="601235" y="3173055"/>
+            <a:ext cx="538196" cy="564237"/>
+          </a:xfrm>
+          <a:prstGeom prst="rect">
+            <a:avLst/>
+          </a:prstGeom>
+        </p:spPr>
+      </p:pic>
+      <p:cxnSp>
+        <p:nvCxnSpPr>
+          <p:cNvPr id="16" name="Straight Connector 15">
+            <a:extLst>
+              <a:ext uri="{FF2B5EF4-FFF2-40B4-BE49-F238E27FC236}">
+                <a16:creationId xmlns:a16="http://schemas.microsoft.com/office/drawing/2014/main" id="{223F5A5D-3FC8-BA4B-9DE0-A946087682CD}"/>
+              </a:ext>
+            </a:extLst>
+          </p:cNvPr>
+          <p:cNvCxnSpPr>
+            <a:cxnSpLocks/>
+            <a:stCxn id="41" idx="1"/>
+            <a:endCxn id="46" idx="3"/>
+          </p:cNvCxnSpPr>
+          <p:nvPr/>
+        </p:nvCxnSpPr>
+        <p:spPr>
+          <a:xfrm flipH="1">
+            <a:off x="1139431" y="3449892"/>
+            <a:ext cx="267497" cy="5282"/>
+          </a:xfrm>
+          <a:prstGeom prst="line">
+            <a:avLst/>
+          </a:prstGeom>
+        </p:spPr>
+        <p:style>
+          <a:lnRef idx="2">
+            <a:schemeClr val="accent1"/>
+          </a:lnRef>
+          <a:fillRef idx="0">
+            <a:schemeClr val="accent1"/>
+          </a:fillRef>
+          <a:effectRef idx="1">
+            <a:schemeClr val="accent1"/>
+          </a:effectRef>
+          <a:fontRef idx="minor">
+            <a:schemeClr val="tx1"/>
+          </a:fontRef>
+        </p:style>
+      </p:cxnSp>
+      <p:sp>
+        <p:nvSpPr>
+          <p:cNvPr id="47" name="TextBox 46">
+            <a:extLst>
+              <a:ext uri="{FF2B5EF4-FFF2-40B4-BE49-F238E27FC236}">
+                <a16:creationId xmlns:a16="http://schemas.microsoft.com/office/drawing/2014/main" id="{265D0E4C-658B-034C-B77D-37D78250893F}"/>
+              </a:ext>
+            </a:extLst>
+          </p:cNvPr>
+          <p:cNvSpPr txBox="1"/>
+          <p:nvPr/>
+        </p:nvSpPr>
+        <p:spPr>
+          <a:xfrm>
+            <a:off x="2904241" y="4814028"/>
+            <a:ext cx="823508" cy="153888"/>
+          </a:xfrm>
+          <a:prstGeom prst="rect">
+            <a:avLst/>
+          </a:prstGeom>
+          <a:noFill/>
+        </p:spPr>
+        <p:txBody>
+          <a:bodyPr wrap="square" lIns="0" tIns="0" rIns="0" bIns="0" rtlCol="0">
+            <a:spAutoFit/>
+          </a:bodyPr>
+          <a:lstStyle/>
+          <a:p>
+            <a:pPr algn="ctr"/>
+            <a:r>
+              <a:rPr lang="en-US" sz="1000" dirty="0">
+                <a:latin typeface="Helvetica Neue"/>
+                <a:cs typeface="Helvetica Neue"/>
+              </a:rPr>
+              <a:t>NAT Gateway</a:t>
+            </a:r>
+          </a:p>
+        </p:txBody>
+      </p:sp>
+      <p:cxnSp>
+        <p:nvCxnSpPr>
+          <p:cNvPr id="48" name="Elbow Connector 47">
+            <a:extLst>
+              <a:ext uri="{FF2B5EF4-FFF2-40B4-BE49-F238E27FC236}">
+                <a16:creationId xmlns:a16="http://schemas.microsoft.com/office/drawing/2014/main" id="{FFF6E95A-9E7A-D94E-B57C-82B925921B5B}"/>
+              </a:ext>
+            </a:extLst>
+          </p:cNvPr>
+          <p:cNvCxnSpPr>
+            <a:stCxn id="30" idx="1"/>
+            <a:endCxn id="41" idx="0"/>
+          </p:cNvCxnSpPr>
+          <p:nvPr/>
+        </p:nvCxnSpPr>
+        <p:spPr>
+          <a:xfrm rot="10800000">
+            <a:off x="1676026" y="3167774"/>
+            <a:ext cx="3552790" cy="138245"/>
+          </a:xfrm>
+          <a:prstGeom prst="bentConnector4">
+            <a:avLst>
+              <a:gd name="adj1" fmla="val 28556"/>
+              <a:gd name="adj2" fmla="val 672987"/>
+            </a:avLst>
+          </a:prstGeom>
+        </p:spPr>
+        <p:style>
+          <a:lnRef idx="2">
+            <a:schemeClr val="accent1"/>
+          </a:lnRef>
+          <a:fillRef idx="0">
+            <a:schemeClr val="accent1"/>
+          </a:fillRef>
+          <a:effectRef idx="1">
+            <a:schemeClr val="accent1"/>
+          </a:effectRef>
+          <a:fontRef idx="minor">
+            <a:schemeClr val="tx1"/>
+          </a:fontRef>
+        </p:style>
+      </p:cxnSp>
+    </p:spTree>
+    <p:extLst>
+      <p:ext uri="{BB962C8B-B14F-4D97-AF65-F5344CB8AC3E}">
+        <p14:creationId xmlns:p14="http://schemas.microsoft.com/office/powerpoint/2010/main" val="4247186340"/>
       </p:ext>
     </p:extLst>
   </p:cSld>

</xml_diff>